<commit_message>
update course time table
update course time table
</commit_message>
<xml_diff>
--- a/Course content/ppts/Graz1_course_organisation.pptx
+++ b/Course content/ppts/Graz1_course_organisation.pptx
@@ -2777,7 +2777,7 @@
               <a:pPr>
                 <a:defRPr/>
               </a:pPr>
-              <a:t>7-10-2025</a:t>
+              <a:t>18-10-2025</a:t>
             </a:fld>
             <a:endParaRPr lang="nl-NL" dirty="0"/>
           </a:p>
@@ -4132,7 +4132,7 @@
             <a:fld id="{AD070533-58A2-4CE7-AF79-C0725D1716D6}" type="datetimeFigureOut">
               <a:rPr lang="en-US" smtClean="0"/>
               <a:pPr/>
-              <a:t>10/7/2025</a:t>
+              <a:t>10/18/2025</a:t>
             </a:fld>
             <a:endParaRPr lang="en-US"/>
           </a:p>
@@ -6668,20 +6668,13 @@
         <p:spPr/>
         <p:txBody>
           <a:bodyPr>
-            <a:normAutofit fontScale="90000"/>
+            <a:normAutofit/>
           </a:bodyPr>
           <a:lstStyle/>
           <a:p>
             <a:r>
               <a:rPr lang="en-GB" dirty="0"/>
-              <a:t>Automatic Speech Recognition</a:t>
-            </a:r>
-            <a:br>
-              <a:rPr lang="en-GB" dirty="0"/>
-            </a:br>
-            <a:r>
-              <a:rPr lang="en-GB" dirty="0"/>
-              <a:t>Towards understanding deep networks</a:t>
+              <a:t>Deep networks, transformers, explainability (ASR)</a:t>
             </a:r>
             <a:endParaRPr lang="en-NL" dirty="0"/>
           </a:p>
@@ -7343,8 +7336,12 @@
           <a:p>
             <a:pPr lvl="1"/>
             <a:r>
+              <a:rPr lang="en-US" sz="2400"/>
+              <a:t>Topic: will </a:t>
+            </a:r>
+            <a:r>
               <a:rPr lang="en-US" sz="2400" dirty="0"/>
-              <a:t>will be discussed later</a:t>
+              <a:t>be discussed later</a:t>
             </a:r>
           </a:p>
           <a:p>
@@ -7486,7 +7483,7 @@
           <a:p>
             <a:r>
               <a:rPr lang="en-GB" dirty="0"/>
-              <a:t>Broad overview</a:t>
+              <a:t>Overview of the course</a:t>
             </a:r>
             <a:endParaRPr lang="en-NL" dirty="0"/>
           </a:p>
@@ -7507,14 +7504,14 @@
           <p:nvPr>
             <p:extLst>
               <p:ext uri="{D42A27DB-BD31-4B8C-83A1-F6EECF244321}">
-                <p14:modId xmlns:p14="http://schemas.microsoft.com/office/powerpoint/2010/main" val="3511632467"/>
+                <p14:modId xmlns:p14="http://schemas.microsoft.com/office/powerpoint/2010/main" val="2650482781"/>
               </p:ext>
             </p:extLst>
           </p:nvPr>
         </p:nvGraphicFramePr>
         <p:xfrm>
           <a:off x="982980" y="1331640"/>
-          <a:ext cx="7117412" cy="5440680"/>
+          <a:ext cx="6762340" cy="5267428"/>
         </p:xfrm>
         <a:graphic>
           <a:graphicData uri="http://schemas.openxmlformats.org/drawingml/2006/table">
@@ -7523,14 +7520,14 @@
                 <a:tableStyleId>{5C22544A-7EE6-4342-B048-85BDC9FD1C3A}</a:tableStyleId>
               </a:tblPr>
               <a:tblGrid>
-                <a:gridCol w="1789220">
+                <a:gridCol w="1716812">
                   <a:extLst>
                     <a:ext uri="{9D8B030D-6E8A-4147-A177-3AD203B41FA5}">
                       <a16:colId xmlns:a16="http://schemas.microsoft.com/office/drawing/2014/main" val="1719224386"/>
                     </a:ext>
                   </a:extLst>
                 </a:gridCol>
-                <a:gridCol w="5328192">
+                <a:gridCol w="5045528">
                   <a:extLst>
                     <a:ext uri="{9D8B030D-6E8A-4147-A177-3AD203B41FA5}">
                       <a16:colId xmlns:a16="http://schemas.microsoft.com/office/drawing/2014/main" val="2092369373"/>
@@ -7562,7 +7559,7 @@
                         <a:defRPr/>
                       </a:pPr>
                       <a:r>
-                        <a:rPr lang="en-GB" sz="2200" dirty="0">
+                        <a:rPr lang="en-GB" sz="2000" dirty="0">
                           <a:solidFill>
                             <a:schemeClr val="tx1"/>
                           </a:solidFill>
@@ -7570,9 +7567,9 @@
                           <a:latin typeface="Arial" panose="020B0604020202020204" pitchFamily="34" charset="0"/>
                           <a:cs typeface="Arial" panose="020B0604020202020204" pitchFamily="34" charset="0"/>
                         </a:rPr>
-                        <a:t>Week</a:t>
+                        <a:t>Date</a:t>
                       </a:r>
-                      <a:endParaRPr lang="en-NL" sz="2200" dirty="0">
+                      <a:endParaRPr lang="en-NL" sz="2000" dirty="0">
                         <a:solidFill>
                           <a:schemeClr val="tx1"/>
                         </a:solidFill>
@@ -7589,7 +7586,7 @@
                     <a:lstStyle/>
                     <a:p>
                       <a:r>
-                        <a:rPr lang="en-GB" sz="2200" dirty="0">
+                        <a:rPr lang="en-GB" sz="2000" dirty="0">
                           <a:solidFill>
                             <a:schemeClr val="tx1"/>
                           </a:solidFill>
@@ -7598,7 +7595,7 @@
                         </a:rPr>
                         <a:t>Topic</a:t>
                       </a:r>
-                      <a:endParaRPr lang="en-NL" sz="2200" dirty="0">
+                      <a:endParaRPr lang="en-NL" sz="2000" dirty="0">
                         <a:solidFill>
                           <a:schemeClr val="tx1"/>
                         </a:solidFill>
@@ -7622,16 +7619,16 @@
                     <a:lstStyle/>
                     <a:p>
                       <a:r>
-                        <a:rPr lang="en-GB" sz="2200" dirty="0">
+                        <a:rPr lang="en-GB" sz="2000" dirty="0">
                           <a:solidFill>
                             <a:schemeClr val="tx1"/>
                           </a:solidFill>
                           <a:latin typeface="Arial" panose="020B0604020202020204" pitchFamily="34" charset="0"/>
                           <a:cs typeface="Arial" panose="020B0604020202020204" pitchFamily="34" charset="0"/>
                         </a:rPr>
-                        <a:t>1-2</a:t>
+                        <a:t>Nov 10, 14</a:t>
                       </a:r>
-                      <a:endParaRPr lang="en-NL" sz="2200" dirty="0">
+                      <a:endParaRPr lang="en-NL" sz="2000" dirty="0">
                         <a:solidFill>
                           <a:schemeClr val="tx1"/>
                         </a:solidFill>
@@ -7665,7 +7662,7 @@
                         <a:defRPr/>
                       </a:pPr>
                       <a:r>
-                        <a:rPr lang="en-GB" sz="2200" dirty="0">
+                        <a:rPr lang="en-GB" sz="2000" dirty="0">
                           <a:solidFill>
                             <a:schemeClr val="tx1"/>
                           </a:solidFill>
@@ -7673,10 +7670,10 @@
                           <a:latin typeface="Arial" panose="020B0604020202020204" pitchFamily="34" charset="0"/>
                           <a:cs typeface="Arial" panose="020B0604020202020204" pitchFamily="34" charset="0"/>
                         </a:rPr>
-                        <a:t>Lecture: Intro, overview</a:t>
+                        <a:t>Lecture: Intro, overview course</a:t>
                       </a:r>
                       <a:br>
-                        <a:rPr lang="en-GB" sz="2200" dirty="0">
+                        <a:rPr lang="en-GB" sz="2000" dirty="0">
                           <a:solidFill>
                             <a:schemeClr val="tx1"/>
                           </a:solidFill>
@@ -7686,7 +7683,7 @@
                         </a:rPr>
                       </a:br>
                       <a:r>
-                        <a:rPr lang="en-GB" sz="2200" dirty="0">
+                        <a:rPr lang="en-GB" sz="2000" dirty="0">
                           <a:solidFill>
                             <a:schemeClr val="tx1"/>
                           </a:solidFill>
@@ -7694,9 +7691,9 @@
                           <a:latin typeface="Arial" panose="020B0604020202020204" pitchFamily="34" charset="0"/>
                           <a:cs typeface="Arial" panose="020B0604020202020204" pitchFamily="34" charset="0"/>
                         </a:rPr>
-                        <a:t>Reading</a:t>
+                        <a:t>Literature</a:t>
                       </a:r>
-                      <a:endParaRPr lang="en-NL" sz="2200" dirty="0">
+                      <a:endParaRPr lang="en-NL" sz="2000" dirty="0">
                         <a:solidFill>
                           <a:schemeClr val="tx1"/>
                         </a:solidFill>
@@ -7720,16 +7717,16 @@
                     <a:lstStyle/>
                     <a:p>
                       <a:r>
-                        <a:rPr lang="en-GB" sz="2200" dirty="0">
+                        <a:rPr lang="en-GB" sz="2000" dirty="0">
                           <a:solidFill>
                             <a:schemeClr val="tx1"/>
                           </a:solidFill>
                           <a:latin typeface="Arial" panose="020B0604020202020204" pitchFamily="34" charset="0"/>
                           <a:cs typeface="Arial" panose="020B0604020202020204" pitchFamily="34" charset="0"/>
                         </a:rPr>
-                        <a:t>3</a:t>
+                        <a:t>Nov 17, 20</a:t>
                       </a:r>
-                      <a:endParaRPr lang="en-NL" sz="2200" dirty="0">
+                      <a:endParaRPr lang="en-NL" sz="2000" dirty="0">
                         <a:solidFill>
                           <a:schemeClr val="tx1"/>
                         </a:solidFill>
@@ -7746,7 +7743,7 @@
                     <a:lstStyle/>
                     <a:p>
                       <a:r>
-                        <a:rPr lang="en-GB" sz="2200" dirty="0">
+                        <a:rPr lang="en-GB" sz="2000" dirty="0">
                           <a:solidFill>
                             <a:schemeClr val="tx1"/>
                           </a:solidFill>
@@ -7755,7 +7752,7 @@
                         </a:rPr>
                         <a:t>Literature, brainstorm topics for experiment</a:t>
                       </a:r>
-                      <a:endParaRPr lang="en-NL" sz="2200" dirty="0">
+                      <a:endParaRPr lang="en-NL" sz="2000" dirty="0">
                         <a:solidFill>
                           <a:schemeClr val="tx1"/>
                         </a:solidFill>
@@ -7779,16 +7776,16 @@
                     <a:lstStyle/>
                     <a:p>
                       <a:r>
-                        <a:rPr lang="en-GB" sz="2200" dirty="0">
+                        <a:rPr lang="en-GB" sz="2000" dirty="0">
                           <a:solidFill>
                             <a:schemeClr val="tx1"/>
                           </a:solidFill>
                           <a:latin typeface="Arial" panose="020B0604020202020204" pitchFamily="34" charset="0"/>
                           <a:cs typeface="Arial" panose="020B0604020202020204" pitchFamily="34" charset="0"/>
                         </a:rPr>
-                        <a:t>4</a:t>
+                        <a:t>Fr Nov 21</a:t>
                       </a:r>
-                      <a:endParaRPr lang="en-NL" sz="2200" dirty="0">
+                      <a:endParaRPr lang="en-NL" sz="2000" dirty="0">
                         <a:solidFill>
                           <a:schemeClr val="tx1"/>
                         </a:solidFill>
@@ -7805,7 +7802,7 @@
                     <a:lstStyle/>
                     <a:p>
                       <a:r>
-                        <a:rPr lang="en-GB" sz="2200" dirty="0">
+                        <a:rPr lang="en-GB" sz="2000" dirty="0">
                           <a:solidFill>
                             <a:schemeClr val="tx1"/>
                           </a:solidFill>
@@ -7813,25 +7810,12 @@
                           <a:latin typeface="Arial" panose="020B0604020202020204" pitchFamily="34" charset="0"/>
                           <a:cs typeface="Arial" panose="020B0604020202020204" pitchFamily="34" charset="0"/>
                         </a:rPr>
-                        <a:t>Literature presentations</a:t>
+                        <a:t>Literature presentations, selection of experimental topic</a:t>
                       </a:r>
                     </a:p>
                     <a:p>
                       <a:r>
-                        <a:rPr lang="en-GB" sz="2200" dirty="0">
-                          <a:solidFill>
-                            <a:schemeClr val="tx1"/>
-                          </a:solidFill>
-                          <a:effectLst/>
-                          <a:latin typeface="Arial" panose="020B0604020202020204" pitchFamily="34" charset="0"/>
-                          <a:cs typeface="Arial" panose="020B0604020202020204" pitchFamily="34" charset="0"/>
-                        </a:rPr>
-                        <a:t>Determine experimental topics</a:t>
-                      </a:r>
-                    </a:p>
-                    <a:p>
-                      <a:r>
-                        <a:rPr lang="en-GB" sz="2200" dirty="0">
+                        <a:rPr lang="en-GB" sz="2000" dirty="0">
                           <a:solidFill>
                             <a:schemeClr val="tx1"/>
                           </a:solidFill>
@@ -7841,7 +7825,7 @@
                         </a:rPr>
                         <a:t>Set-up (small) experiments</a:t>
                       </a:r>
-                      <a:endParaRPr lang="en-NL" sz="2200" dirty="0">
+                      <a:endParaRPr lang="en-NL" sz="2000" dirty="0">
                         <a:solidFill>
                           <a:schemeClr val="tx1"/>
                         </a:solidFill>
@@ -7865,16 +7849,16 @@
                     <a:lstStyle/>
                     <a:p>
                       <a:r>
-                        <a:rPr lang="en-GB" sz="2200" dirty="0">
+                        <a:rPr lang="en-GB" sz="2000" dirty="0">
                           <a:solidFill>
                             <a:schemeClr val="tx1"/>
                           </a:solidFill>
                           <a:latin typeface="Arial" panose="020B0604020202020204" pitchFamily="34" charset="0"/>
                           <a:cs typeface="Arial" panose="020B0604020202020204" pitchFamily="34" charset="0"/>
                         </a:rPr>
-                        <a:t>5</a:t>
+                        <a:t>Nov 24 2x</a:t>
                       </a:r>
-                      <a:endParaRPr lang="en-NL" sz="2200" dirty="0">
+                      <a:endParaRPr lang="en-NL" sz="2000" dirty="0">
                         <a:solidFill>
                           <a:schemeClr val="tx1"/>
                         </a:solidFill>
@@ -7891,16 +7875,16 @@
                     <a:lstStyle/>
                     <a:p>
                       <a:r>
-                        <a:rPr lang="en-GB" sz="2200" dirty="0">
+                        <a:rPr lang="en-GB" sz="2000" dirty="0">
                           <a:solidFill>
                             <a:schemeClr val="tx1"/>
                           </a:solidFill>
                           <a:latin typeface="Arial" panose="020B0604020202020204" pitchFamily="34" charset="0"/>
                           <a:cs typeface="Arial" panose="020B0604020202020204" pitchFamily="34" charset="0"/>
                         </a:rPr>
-                        <a:t>Reporting ongoing experiments</a:t>
+                        <a:t>Start experiments, discussion ongoing experiments</a:t>
                       </a:r>
-                      <a:endParaRPr lang="en-NL" sz="2200" dirty="0">
+                      <a:endParaRPr lang="en-NL" sz="2000" dirty="0">
                         <a:solidFill>
                           <a:schemeClr val="tx1"/>
                         </a:solidFill>
@@ -7924,18 +7908,69 @@
                     <a:lstStyle/>
                     <a:p>
                       <a:r>
-                        <a:rPr lang="en-GB" sz="2200" dirty="0">
+                        <a:rPr lang="en-GB" sz="2000" dirty="0">
                           <a:solidFill>
                             <a:schemeClr val="tx1"/>
                           </a:solidFill>
                           <a:latin typeface="Arial" panose="020B0604020202020204" pitchFamily="34" charset="0"/>
                           <a:cs typeface="Arial" panose="020B0604020202020204" pitchFamily="34" charset="0"/>
                         </a:rPr>
-                        <a:t>6-7</a:t>
+                        <a:t>Dec 1</a:t>
                       </a:r>
-                      <a:endParaRPr lang="en-NL" sz="2200" dirty="0">
+                    </a:p>
+                    <a:p>
+                      <a:endParaRPr lang="en-GB" sz="2000" dirty="0">
                         <a:solidFill>
                           <a:schemeClr val="tx1"/>
+                        </a:solidFill>
+                        <a:latin typeface="Arial" panose="020B0604020202020204" pitchFamily="34" charset="0"/>
+                        <a:cs typeface="Arial" panose="020B0604020202020204" pitchFamily="34" charset="0"/>
+                      </a:endParaRPr>
+                    </a:p>
+                    <a:p>
+                      <a:endParaRPr lang="en-GB" sz="2000" dirty="0">
+                        <a:solidFill>
+                          <a:schemeClr val="tx1"/>
+                        </a:solidFill>
+                        <a:latin typeface="Arial" panose="020B0604020202020204" pitchFamily="34" charset="0"/>
+                        <a:cs typeface="Arial" panose="020B0604020202020204" pitchFamily="34" charset="0"/>
+                      </a:endParaRPr>
+                    </a:p>
+                    <a:p>
+                      <a:endParaRPr lang="en-GB" sz="2000" dirty="0">
+                        <a:solidFill>
+                          <a:schemeClr val="tx1"/>
+                        </a:solidFill>
+                        <a:latin typeface="Arial" panose="020B0604020202020204" pitchFamily="34" charset="0"/>
+                        <a:cs typeface="Arial" panose="020B0604020202020204" pitchFamily="34" charset="0"/>
+                      </a:endParaRPr>
+                    </a:p>
+                    <a:p>
+                      <a:r>
+                        <a:rPr lang="en-GB" sz="2000" dirty="0">
+                          <a:solidFill>
+                            <a:schemeClr val="tx1"/>
+                          </a:solidFill>
+                          <a:latin typeface="Arial" panose="020B0604020202020204" pitchFamily="34" charset="0"/>
+                          <a:cs typeface="Arial" panose="020B0604020202020204" pitchFamily="34" charset="0"/>
+                        </a:rPr>
+                        <a:t>Tue Dec 9</a:t>
+                      </a:r>
+                    </a:p>
+                    <a:p>
+                      <a:r>
+                        <a:rPr lang="en-GB" sz="2000" dirty="0">
+                          <a:solidFill>
+                            <a:srgbClr val="C00000"/>
+                          </a:solidFill>
+                          <a:latin typeface="Arial" panose="020B0604020202020204" pitchFamily="34" charset="0"/>
+                          <a:cs typeface="Arial" panose="020B0604020202020204" pitchFamily="34" charset="0"/>
+                        </a:rPr>
+                        <a:t>Mon Dec 15</a:t>
+                      </a:r>
+                      <a:endParaRPr lang="en-NL" sz="2000" dirty="0">
+                        <a:solidFill>
+                          <a:srgbClr val="C00000"/>
                         </a:solidFill>
                         <a:latin typeface="Arial" panose="020B0604020202020204" pitchFamily="34" charset="0"/>
                         <a:cs typeface="Arial" panose="020B0604020202020204" pitchFamily="34" charset="0"/>
@@ -7967,7 +8002,7 @@
                         <a:defRPr/>
                       </a:pPr>
                       <a:r>
-                        <a:rPr lang="en-GB" sz="2200" dirty="0">
+                        <a:rPr lang="en-GB" sz="2000" dirty="0">
                           <a:solidFill>
                             <a:schemeClr val="tx1"/>
                           </a:solidFill>
@@ -7975,10 +8010,10 @@
                           <a:latin typeface="Arial" panose="020B0604020202020204" pitchFamily="34" charset="0"/>
                           <a:cs typeface="Arial" panose="020B0604020202020204" pitchFamily="34" charset="0"/>
                         </a:rPr>
-                        <a:t>Groups of 2 or 3:</a:t>
+                        <a:t>In groups or individual:</a:t>
                       </a:r>
                       <a:br>
-                        <a:rPr lang="en-GB" sz="2200" dirty="0">
+                        <a:rPr lang="en-GB" sz="2000" dirty="0">
                           <a:solidFill>
                             <a:schemeClr val="tx1"/>
                           </a:solidFill>
@@ -7988,7 +8023,7 @@
                         </a:rPr>
                       </a:br>
                       <a:r>
-                        <a:rPr lang="en-GB" sz="2200" dirty="0">
+                        <a:rPr lang="en-GB" sz="2000" dirty="0">
                           <a:solidFill>
                             <a:schemeClr val="tx1"/>
                           </a:solidFill>
@@ -8018,7 +8053,7 @@
                         <a:defRPr/>
                       </a:pPr>
                       <a:r>
-                        <a:rPr lang="en-GB" sz="2200" dirty="0">
+                        <a:rPr lang="en-GB" sz="2000" dirty="0">
                           <a:solidFill>
                             <a:schemeClr val="tx1"/>
                           </a:solidFill>
@@ -8026,7 +8061,7 @@
                           <a:latin typeface="Arial" panose="020B0604020202020204" pitchFamily="34" charset="0"/>
                           <a:cs typeface="Arial" panose="020B0604020202020204" pitchFamily="34" charset="0"/>
                         </a:rPr>
-                        <a:t>Presentations of experimental results</a:t>
+                        <a:t>Presentations of prelim experimental results</a:t>
                       </a:r>
                     </a:p>
                     <a:p>
@@ -8048,7 +8083,7 @@
                         <a:defRPr/>
                       </a:pPr>
                       <a:r>
-                        <a:rPr lang="en-GB" sz="2200" dirty="0">
+                        <a:rPr lang="en-GB" sz="2000" dirty="0">
                           <a:solidFill>
                             <a:schemeClr val="tx1"/>
                           </a:solidFill>
@@ -8056,7 +8091,7 @@
                           <a:latin typeface="Arial" panose="020B0604020202020204" pitchFamily="34" charset="0"/>
                           <a:cs typeface="Arial" panose="020B0604020202020204" pitchFamily="34" charset="0"/>
                         </a:rPr>
-                        <a:t>Assessment</a:t>
+                        <a:t>Presentations </a:t>
                       </a:r>
                     </a:p>
                     <a:p>
@@ -8078,25 +8113,16 @@
                         <a:defRPr/>
                       </a:pPr>
                       <a:r>
-                        <a:rPr lang="en-GB" sz="2200" dirty="0">
+                        <a:rPr lang="en-GB" sz="2000" dirty="0">
                           <a:solidFill>
-                            <a:schemeClr val="tx1"/>
+                            <a:srgbClr val="C00000"/>
                           </a:solidFill>
                           <a:effectLst/>
                           <a:latin typeface="Arial" panose="020B0604020202020204" pitchFamily="34" charset="0"/>
                           <a:cs typeface="Arial" panose="020B0604020202020204" pitchFamily="34" charset="0"/>
                         </a:rPr>
-                        <a:t>Closing</a:t>
+                        <a:t>Assessments and closing</a:t>
                       </a:r>
-                    </a:p>
-                    <a:p>
-                      <a:endParaRPr lang="en-NL" sz="2200" dirty="0">
-                        <a:solidFill>
-                          <a:schemeClr val="tx1"/>
-                        </a:solidFill>
-                        <a:latin typeface="Arial" panose="020B0604020202020204" pitchFamily="34" charset="0"/>
-                        <a:cs typeface="Arial" panose="020B0604020202020204" pitchFamily="34" charset="0"/>
-                      </a:endParaRPr>
                     </a:p>
                   </a:txBody>
                   <a:tcPr marL="68580" marR="68580" marT="34290" marB="34290"/>

</xml_diff>